<commit_message>
ppt Aula 05 IoT Python 04042023
</commit_message>
<xml_diff>
--- a/01 Classes/Aula 05 - Aplicação Cloud Indústria 40 Python IoT Plataforma Nodemcu.pptx
+++ b/01 Classes/Aula 05 - Aplicação Cloud Indústria 40 Python IoT Plataforma Nodemcu.pptx
@@ -7790,7 +7790,38 @@
                 <a:latin typeface="Times New Roman" panose="02020603050405020304" pitchFamily="18" charset="0"/>
                 <a:cs typeface="Times New Roman" panose="02020603050405020304" pitchFamily="18" charset="0"/>
               </a:rPr>
-              <a:t>[1] Arduíno – Instalação e Configuração da IDE no Windows.</a:t>
+              <a:t>[1] </a:t>
+            </a:r>
+            <a:r>
+              <a:rPr lang="pt-BR" sz="2400" b="1" dirty="0">
+                <a:latin typeface="Times New Roman" panose="02020603050405020304" pitchFamily="18" charset="0"/>
+                <a:cs typeface="Times New Roman" panose="02020603050405020304" pitchFamily="18" charset="0"/>
+              </a:rPr>
+              <a:t>Arduíno</a:t>
+            </a:r>
+            <a:r>
+              <a:rPr lang="pt-BR" sz="2400" dirty="0">
+                <a:latin typeface="Times New Roman" panose="02020603050405020304" pitchFamily="18" charset="0"/>
+                <a:cs typeface="Times New Roman" panose="02020603050405020304" pitchFamily="18" charset="0"/>
+              </a:rPr>
+              <a:t> – Instalação e Configuração da </a:t>
+            </a:r>
+            <a:r>
+              <a:rPr lang="pt-BR" sz="2400" b="1" dirty="0">
+                <a:solidFill>
+                  <a:srgbClr val="FF0000"/>
+                </a:solidFill>
+                <a:latin typeface="Times New Roman" panose="02020603050405020304" pitchFamily="18" charset="0"/>
+                <a:cs typeface="Times New Roman" panose="02020603050405020304" pitchFamily="18" charset="0"/>
+              </a:rPr>
+              <a:t>IDE no Windows</a:t>
+            </a:r>
+            <a:r>
+              <a:rPr lang="pt-BR" sz="2400" dirty="0">
+                <a:latin typeface="Times New Roman" panose="02020603050405020304" pitchFamily="18" charset="0"/>
+                <a:cs typeface="Times New Roman" panose="02020603050405020304" pitchFamily="18" charset="0"/>
+              </a:rPr>
+              <a:t>.</a:t>
             </a:r>
           </a:p>
           <a:p>
@@ -7838,10 +7869,17 @@
                 <a:latin typeface="Times New Roman" panose="02020603050405020304" pitchFamily="18" charset="0"/>
                 <a:cs typeface="Times New Roman" panose="02020603050405020304" pitchFamily="18" charset="0"/>
               </a:rPr>
-              <a:t>[2] Sistema utilizando o módulo ESP8266 </a:t>
-            </a:r>
-            <a:r>
-              <a:rPr lang="pt-BR" sz="2400" dirty="0" err="1">
+              <a:t>[2] Sistema utilizando o </a:t>
+            </a:r>
+            <a:r>
+              <a:rPr lang="pt-BR" sz="2400" b="1" dirty="0">
+                <a:latin typeface="Times New Roman" panose="02020603050405020304" pitchFamily="18" charset="0"/>
+                <a:cs typeface="Times New Roman" panose="02020603050405020304" pitchFamily="18" charset="0"/>
+              </a:rPr>
+              <a:t>módulo ESP8266 </a:t>
+            </a:r>
+            <a:r>
+              <a:rPr lang="pt-BR" sz="2400" b="1" dirty="0" err="1">
                 <a:latin typeface="Times New Roman" panose="02020603050405020304" pitchFamily="18" charset="0"/>
                 <a:cs typeface="Times New Roman" panose="02020603050405020304" pitchFamily="18" charset="0"/>
               </a:rPr>
@@ -8226,7 +8264,44 @@
                 <a:latin typeface="Times New Roman" panose="02020603050405020304" pitchFamily="18" charset="0"/>
                 <a:cs typeface="Times New Roman" panose="02020603050405020304" pitchFamily="18" charset="0"/>
               </a:rPr>
-              <a:t>-- Quiz 1</a:t>
+              <a:t>-- Quiz 1 (</a:t>
+            </a:r>
+            <a:r>
+              <a:rPr lang="pt-BR" sz="2000" b="1" dirty="0">
+                <a:solidFill>
+                  <a:srgbClr val="FF0000"/>
+                </a:solidFill>
+                <a:latin typeface="Times New Roman" panose="02020603050405020304" pitchFamily="18" charset="0"/>
+                <a:cs typeface="Times New Roman" panose="02020603050405020304" pitchFamily="18" charset="0"/>
+              </a:rPr>
+              <a:t>ESP8266 </a:t>
+            </a:r>
+            <a:r>
+              <a:rPr lang="pt-BR" sz="2000" b="1" dirty="0" err="1">
+                <a:solidFill>
+                  <a:srgbClr val="FF0000"/>
+                </a:solidFill>
+                <a:latin typeface="Times New Roman" panose="02020603050405020304" pitchFamily="18" charset="0"/>
+                <a:cs typeface="Times New Roman" panose="02020603050405020304" pitchFamily="18" charset="0"/>
+              </a:rPr>
+              <a:t>Wifi</a:t>
+            </a:r>
+            <a:r>
+              <a:rPr lang="pt-BR" sz="2000" b="1" dirty="0">
+                <a:solidFill>
+                  <a:srgbClr val="FF0000"/>
+                </a:solidFill>
+                <a:latin typeface="Times New Roman" panose="02020603050405020304" pitchFamily="18" charset="0"/>
+                <a:cs typeface="Times New Roman" panose="02020603050405020304" pitchFamily="18" charset="0"/>
+              </a:rPr>
+              <a:t> Module e Arduino</a:t>
+            </a:r>
+            <a:r>
+              <a:rPr lang="pt-BR" sz="2000" b="1" dirty="0">
+                <a:latin typeface="Times New Roman" panose="02020603050405020304" pitchFamily="18" charset="0"/>
+                <a:cs typeface="Times New Roman" panose="02020603050405020304" pitchFamily="18" charset="0"/>
+              </a:rPr>
+              <a:t>)</a:t>
             </a:r>
           </a:p>
           <a:p>
@@ -8239,7 +8314,24 @@
                 <a:cs typeface="Times New Roman" panose="02020603050405020304" pitchFamily="18" charset="0"/>
                 <a:hlinkClick r:id="rId3"/>
               </a:rPr>
-              <a:t>https://engineeringinterviewquestions.com/mcqs-on-esp8266-wifi-module-answers/</a:t>
+              <a:t>https://www.sanfoundry.com/arduino-basic-questions-answers/</a:t>
+            </a:r>
+            <a:endParaRPr lang="pt-BR" sz="2000" dirty="0">
+              <a:latin typeface="Times New Roman" panose="02020603050405020304" pitchFamily="18" charset="0"/>
+              <a:cs typeface="Times New Roman" panose="02020603050405020304" pitchFamily="18" charset="0"/>
+            </a:endParaRPr>
+          </a:p>
+          <a:p>
+            <a:pPr marL="0" indent="0" algn="just">
+              <a:buNone/>
+            </a:pPr>
+            <a:r>
+              <a:rPr lang="pt-BR" sz="2000" dirty="0">
+                <a:latin typeface="Times New Roman" panose="02020603050405020304" pitchFamily="18" charset="0"/>
+                <a:cs typeface="Times New Roman" panose="02020603050405020304" pitchFamily="18" charset="0"/>
+                <a:hlinkClick r:id="rId4"/>
+              </a:rPr>
+              <a:t>https://www.sanfoundry.com/1000-arduino-questions-answers/</a:t>
             </a:r>
             <a:endParaRPr lang="pt-BR" sz="2000" dirty="0">
               <a:latin typeface="Times New Roman" panose="02020603050405020304" pitchFamily="18" charset="0"/>
@@ -8275,7 +8367,7 @@
               <a:rPr lang="pt-BR" sz="2000" dirty="0">
                 <a:latin typeface="Times New Roman" panose="02020603050405020304" pitchFamily="18" charset="0"/>
                 <a:cs typeface="Times New Roman" panose="02020603050405020304" pitchFamily="18" charset="0"/>
-                <a:hlinkClick r:id="rId4"/>
+                <a:hlinkClick r:id="rId5"/>
               </a:rPr>
               <a:t>https://iot4beginners.com/nodemcu_esp8266-quiz_1/</a:t>
             </a:r>
@@ -8313,7 +8405,7 @@
               <a:rPr lang="pt-BR" sz="2000" dirty="0">
                 <a:latin typeface="Times New Roman" panose="02020603050405020304" pitchFamily="18" charset="0"/>
                 <a:cs typeface="Times New Roman" panose="02020603050405020304" pitchFamily="18" charset="0"/>
-                <a:hlinkClick r:id="rId5"/>
+                <a:hlinkClick r:id="rId6"/>
               </a:rPr>
               <a:t>https://iot4beginners.com/nodemcu_esp8266-quiz_3/</a:t>
             </a:r>

</xml_diff>